<commit_message>
[#15] fix teachers issues in presentation
</commit_message>
<xml_diff>
--- a/doc/presentation/КлимовИС_ВКР_презентация.pptx
+++ b/doc/presentation/КлимовИС_ВКР_презентация.pptx
@@ -5,7 +5,7 @@
     <p:sldMasterId id="2147483648" r:id="rId1"/>
   </p:sldMasterIdLst>
   <p:notesMasterIdLst>
-    <p:notesMasterId r:id="rId17"/>
+    <p:notesMasterId r:id="rId19"/>
   </p:notesMasterIdLst>
   <p:sldIdLst>
     <p:sldId id="256" r:id="rId2"/>
@@ -17,12 +17,14 @@
     <p:sldId id="261" r:id="rId8"/>
     <p:sldId id="279" r:id="rId9"/>
     <p:sldId id="280" r:id="rId10"/>
-    <p:sldId id="281" r:id="rId11"/>
-    <p:sldId id="282" r:id="rId12"/>
-    <p:sldId id="283" r:id="rId13"/>
-    <p:sldId id="284" r:id="rId14"/>
-    <p:sldId id="285" r:id="rId15"/>
-    <p:sldId id="266" r:id="rId16"/>
+    <p:sldId id="286" r:id="rId11"/>
+    <p:sldId id="287" r:id="rId12"/>
+    <p:sldId id="281" r:id="rId13"/>
+    <p:sldId id="282" r:id="rId14"/>
+    <p:sldId id="283" r:id="rId15"/>
+    <p:sldId id="284" r:id="rId16"/>
+    <p:sldId id="285" r:id="rId17"/>
+    <p:sldId id="266" r:id="rId18"/>
   </p:sldIdLst>
   <p:sldSz cx="12192000" cy="6858000"/>
   <p:notesSz cx="6858000" cy="9144000"/>
@@ -211,7 +213,7 @@
           <a:p>
             <a:fld id="{A1FA72BB-6139-4A02-8082-35B9C9D89E0C}" type="datetimeFigureOut">
               <a:rPr lang="ru-RU" smtClean="0"/>
-              <a:t>29.05.2023</a:t>
+              <a:t>30.05.2023</a:t>
             </a:fld>
             <a:endParaRPr lang="ru-RU"/>
           </a:p>
@@ -543,7 +545,7 @@
           <a:p>
             <a:fld id="{E3BF92F7-6176-4844-94CE-FF1FD83770F1}" type="slidenum">
               <a:rPr lang="ru-RU" smtClean="0"/>
-              <a:t>15</a:t>
+              <a:t>17</a:t>
             </a:fld>
             <a:endParaRPr lang="ru-RU"/>
           </a:p>
@@ -709,7 +711,7 @@
           <a:p>
             <a:fld id="{D006F585-C031-4F3D-8109-2C1271EAF95C}" type="datetime1">
               <a:rPr lang="ru-RU" smtClean="0"/>
-              <a:t>29.05.2023</a:t>
+              <a:t>30.05.2023</a:t>
             </a:fld>
             <a:endParaRPr lang="ru-RU"/>
           </a:p>
@@ -907,7 +909,7 @@
           <a:p>
             <a:fld id="{863B978C-907D-410C-AC33-C70FB0065AB1}" type="datetime1">
               <a:rPr lang="ru-RU" smtClean="0"/>
-              <a:t>29.05.2023</a:t>
+              <a:t>30.05.2023</a:t>
             </a:fld>
             <a:endParaRPr lang="ru-RU"/>
           </a:p>
@@ -1115,7 +1117,7 @@
           <a:p>
             <a:fld id="{7370F86F-261F-4C2A-B7CA-06D91EEBB15B}" type="datetime1">
               <a:rPr lang="ru-RU" smtClean="0"/>
-              <a:t>29.05.2023</a:t>
+              <a:t>30.05.2023</a:t>
             </a:fld>
             <a:endParaRPr lang="ru-RU"/>
           </a:p>
@@ -1313,7 +1315,7 @@
           <a:p>
             <a:fld id="{AFEE3786-D129-4BD2-B6F3-55FC5BC12532}" type="datetime1">
               <a:rPr lang="ru-RU" smtClean="0"/>
-              <a:t>29.05.2023</a:t>
+              <a:t>30.05.2023</a:t>
             </a:fld>
             <a:endParaRPr lang="ru-RU"/>
           </a:p>
@@ -1588,7 +1590,7 @@
           <a:p>
             <a:fld id="{C9466CFB-2389-4A9C-AD12-8B6FB05D3E41}" type="datetime1">
               <a:rPr lang="ru-RU" smtClean="0"/>
-              <a:t>29.05.2023</a:t>
+              <a:t>30.05.2023</a:t>
             </a:fld>
             <a:endParaRPr lang="ru-RU"/>
           </a:p>
@@ -1853,7 +1855,7 @@
           <a:p>
             <a:fld id="{6E930FF5-4E67-4BB3-A0D6-D5DBBB9A8A64}" type="datetime1">
               <a:rPr lang="ru-RU" smtClean="0"/>
-              <a:t>29.05.2023</a:t>
+              <a:t>30.05.2023</a:t>
             </a:fld>
             <a:endParaRPr lang="ru-RU"/>
           </a:p>
@@ -2265,7 +2267,7 @@
           <a:p>
             <a:fld id="{1F915F62-A180-4781-87B2-C363CCD39E80}" type="datetime1">
               <a:rPr lang="ru-RU" smtClean="0"/>
-              <a:t>29.05.2023</a:t>
+              <a:t>30.05.2023</a:t>
             </a:fld>
             <a:endParaRPr lang="ru-RU"/>
           </a:p>
@@ -2406,7 +2408,7 @@
           <a:p>
             <a:fld id="{67FD249C-BC1A-4A70-A502-0DCD1E4E82B3}" type="datetime1">
               <a:rPr lang="ru-RU" smtClean="0"/>
-              <a:t>29.05.2023</a:t>
+              <a:t>30.05.2023</a:t>
             </a:fld>
             <a:endParaRPr lang="ru-RU"/>
           </a:p>
@@ -2519,7 +2521,7 @@
           <a:p>
             <a:fld id="{45D5B91C-A2D9-4813-A97B-31FA3A6207FE}" type="datetime1">
               <a:rPr lang="ru-RU" smtClean="0"/>
-              <a:t>29.05.2023</a:t>
+              <a:t>30.05.2023</a:t>
             </a:fld>
             <a:endParaRPr lang="ru-RU"/>
           </a:p>
@@ -2830,7 +2832,7 @@
           <a:p>
             <a:fld id="{BD9E5343-4C2F-4429-B1C5-87457F54369C}" type="datetime1">
               <a:rPr lang="ru-RU" smtClean="0"/>
-              <a:t>29.05.2023</a:t>
+              <a:t>30.05.2023</a:t>
             </a:fld>
             <a:endParaRPr lang="ru-RU"/>
           </a:p>
@@ -3118,7 +3120,7 @@
           <a:p>
             <a:fld id="{802D0396-A548-40ED-918D-A78893C27574}" type="datetime1">
               <a:rPr lang="ru-RU" smtClean="0"/>
-              <a:t>29.05.2023</a:t>
+              <a:t>30.05.2023</a:t>
             </a:fld>
             <a:endParaRPr lang="ru-RU"/>
           </a:p>
@@ -3359,7 +3361,7 @@
           <a:p>
             <a:fld id="{3ECCE158-C433-4D4B-A18E-F373B1318AC3}" type="datetime1">
               <a:rPr lang="ru-RU" smtClean="0"/>
-              <a:t>29.05.2023</a:t>
+              <a:t>30.05.2023</a:t>
             </a:fld>
             <a:endParaRPr lang="ru-RU"/>
           </a:p>
@@ -4026,7 +4028,7 @@
                 <a:latin typeface="Times New Roman" panose="02020603050405020304" pitchFamily="18" charset="0"/>
                 <a:cs typeface="Times New Roman" panose="02020603050405020304" pitchFamily="18" charset="0"/>
               </a:rPr>
-              <a:t>Классификация кода по наличию дефекта</a:t>
+              <a:t>Обучение модели градиентного бустинга</a:t>
             </a:r>
             <a:endParaRPr lang="ru-RU" sz="3600" dirty="0">
               <a:latin typeface="Times New Roman" panose="02020603050405020304" pitchFamily="18" charset="0"/>
@@ -4059,6 +4061,544 @@
             <a:fld id="{E83D2FD5-BBDA-43D0-B172-791327EA2B6A}" type="slidenum">
               <a:rPr lang="ru-RU" smtClean="0"/>
               <a:t>10</a:t>
+            </a:fld>
+            <a:endParaRPr lang="ru-RU"/>
+          </a:p>
+        </p:txBody>
+      </p:sp>
+      <p:pic>
+        <p:nvPicPr>
+          <p:cNvPr id="11" name="Рисунок 10"/>
+          <p:cNvPicPr>
+            <a:picLocks noChangeAspect="1"/>
+          </p:cNvPicPr>
+          <p:nvPr/>
+        </p:nvPicPr>
+        <p:blipFill rotWithShape="1">
+          <a:blip r:embed="rId2"/>
+          <a:srcRect l="19221" t="-12618" r="20428" b="-11216"/>
+          <a:stretch/>
+        </p:blipFill>
+        <p:spPr>
+          <a:xfrm>
+            <a:off x="182173" y="2247293"/>
+            <a:ext cx="6359726" cy="699570"/>
+          </a:xfrm>
+          <a:prstGeom prst="rect">
+            <a:avLst/>
+          </a:prstGeom>
+        </p:spPr>
+      </p:pic>
+      <p:pic>
+        <p:nvPicPr>
+          <p:cNvPr id="12" name="Рисунок 11"/>
+          <p:cNvPicPr>
+            <a:picLocks noChangeAspect="1"/>
+          </p:cNvPicPr>
+          <p:nvPr/>
+        </p:nvPicPr>
+        <p:blipFill rotWithShape="1">
+          <a:blip r:embed="rId3"/>
+          <a:srcRect l="31895" t="-5415" r="33705" b="6721"/>
+          <a:stretch/>
+        </p:blipFill>
+        <p:spPr>
+          <a:xfrm>
+            <a:off x="7462982" y="2050070"/>
+            <a:ext cx="3509321" cy="938897"/>
+          </a:xfrm>
+          <a:prstGeom prst="rect">
+            <a:avLst/>
+          </a:prstGeom>
+        </p:spPr>
+      </p:pic>
+      <p:sp>
+        <p:nvSpPr>
+          <p:cNvPr id="3" name="TextBox 2"/>
+          <p:cNvSpPr txBox="1"/>
+          <p:nvPr/>
+        </p:nvSpPr>
+        <p:spPr>
+          <a:xfrm>
+            <a:off x="955963" y="1691815"/>
+            <a:ext cx="4812145" cy="461665"/>
+          </a:xfrm>
+          <a:prstGeom prst="rect">
+            <a:avLst/>
+          </a:prstGeom>
+          <a:noFill/>
+        </p:spPr>
+        <p:txBody>
+          <a:bodyPr wrap="square" rtlCol="0">
+            <a:spAutoFit/>
+          </a:bodyPr>
+          <a:lstStyle/>
+          <a:p>
+            <a:r>
+              <a:rPr lang="ru-RU" sz="2400" dirty="0" smtClean="0">
+                <a:latin typeface="Times New Roman" panose="02020603050405020304" pitchFamily="18" charset="0"/>
+                <a:cs typeface="Times New Roman" panose="02020603050405020304" pitchFamily="18" charset="0"/>
+              </a:rPr>
+              <a:t>Логарифмическая функция потерь</a:t>
+            </a:r>
+            <a:endParaRPr lang="ru-RU" sz="2400" dirty="0">
+              <a:latin typeface="Times New Roman" panose="02020603050405020304" pitchFamily="18" charset="0"/>
+              <a:cs typeface="Times New Roman" panose="02020603050405020304" pitchFamily="18" charset="0"/>
+            </a:endParaRPr>
+          </a:p>
+        </p:txBody>
+      </p:sp>
+      <p:sp>
+        <p:nvSpPr>
+          <p:cNvPr id="9" name="TextBox 8"/>
+          <p:cNvSpPr txBox="1"/>
+          <p:nvPr/>
+        </p:nvSpPr>
+        <p:spPr>
+          <a:xfrm>
+            <a:off x="8232743" y="1517134"/>
+            <a:ext cx="2139694" cy="461665"/>
+          </a:xfrm>
+          <a:prstGeom prst="rect">
+            <a:avLst/>
+          </a:prstGeom>
+          <a:noFill/>
+        </p:spPr>
+        <p:txBody>
+          <a:bodyPr wrap="square" rtlCol="0">
+            <a:spAutoFit/>
+          </a:bodyPr>
+          <a:lstStyle/>
+          <a:p>
+            <a:r>
+              <a:rPr lang="ru-RU" sz="2400" dirty="0" smtClean="0">
+                <a:latin typeface="Times New Roman" panose="02020603050405020304" pitchFamily="18" charset="0"/>
+                <a:cs typeface="Times New Roman" panose="02020603050405020304" pitchFamily="18" charset="0"/>
+              </a:rPr>
+              <a:t>Антиградиент</a:t>
+            </a:r>
+            <a:endParaRPr lang="ru-RU" sz="2400" dirty="0">
+              <a:latin typeface="Times New Roman" panose="02020603050405020304" pitchFamily="18" charset="0"/>
+              <a:cs typeface="Times New Roman" panose="02020603050405020304" pitchFamily="18" charset="0"/>
+            </a:endParaRPr>
+          </a:p>
+        </p:txBody>
+      </p:sp>
+      <p:pic>
+        <p:nvPicPr>
+          <p:cNvPr id="4" name="Рисунок 3"/>
+          <p:cNvPicPr>
+            <a:picLocks noChangeAspect="1"/>
+          </p:cNvPicPr>
+          <p:nvPr/>
+        </p:nvPicPr>
+        <p:blipFill rotWithShape="1">
+          <a:blip r:embed="rId4"/>
+          <a:srcRect r="10082"/>
+          <a:stretch/>
+        </p:blipFill>
+        <p:spPr>
+          <a:xfrm>
+            <a:off x="428018" y="4798671"/>
+            <a:ext cx="9399474" cy="1605606"/>
+          </a:xfrm>
+          <a:prstGeom prst="rect">
+            <a:avLst/>
+          </a:prstGeom>
+        </p:spPr>
+      </p:pic>
+      <p:pic>
+        <p:nvPicPr>
+          <p:cNvPr id="5" name="Рисунок 4"/>
+          <p:cNvPicPr>
+            <a:picLocks noChangeAspect="1"/>
+          </p:cNvPicPr>
+          <p:nvPr/>
+        </p:nvPicPr>
+        <p:blipFill rotWithShape="1">
+          <a:blip r:embed="rId5"/>
+          <a:srcRect r="34459"/>
+          <a:stretch/>
+        </p:blipFill>
+        <p:spPr>
+          <a:xfrm>
+            <a:off x="428017" y="3727545"/>
+            <a:ext cx="6850238" cy="1071126"/>
+          </a:xfrm>
+          <a:prstGeom prst="rect">
+            <a:avLst/>
+          </a:prstGeom>
+        </p:spPr>
+      </p:pic>
+    </p:spTree>
+    <p:extLst>
+      <p:ext uri="{BB962C8B-B14F-4D97-AF65-F5344CB8AC3E}">
+        <p14:creationId xmlns:p14="http://schemas.microsoft.com/office/powerpoint/2010/main" val="2782269109"/>
+      </p:ext>
+    </p:extLst>
+  </p:cSld>
+  <p:clrMapOvr>
+    <a:masterClrMapping/>
+  </p:clrMapOvr>
+</p:sld>
+</file>
+
+<file path=ppt/slides/slide11.xml><?xml version="1.0" encoding="utf-8"?>
+<p:sld xmlns:a="http://schemas.openxmlformats.org/drawingml/2006/main" xmlns:r="http://schemas.openxmlformats.org/officeDocument/2006/relationships" xmlns:p="http://schemas.openxmlformats.org/presentationml/2006/main">
+  <p:cSld>
+    <p:spTree>
+      <p:nvGrpSpPr>
+        <p:cNvPr id="1" name=""/>
+        <p:cNvGrpSpPr/>
+        <p:nvPr/>
+      </p:nvGrpSpPr>
+      <p:grpSpPr>
+        <a:xfrm>
+          <a:off x="0" y="0"/>
+          <a:ext cx="0" cy="0"/>
+          <a:chOff x="0" y="0"/>
+          <a:chExt cx="0" cy="0"/>
+        </a:xfrm>
+      </p:grpSpPr>
+      <p:sp>
+        <p:nvSpPr>
+          <p:cNvPr id="4" name="Номер слайда 3"/>
+          <p:cNvSpPr>
+            <a:spLocks noGrp="1"/>
+          </p:cNvSpPr>
+          <p:nvPr>
+            <p:ph type="sldNum" sz="quarter" idx="12"/>
+          </p:nvPr>
+        </p:nvSpPr>
+        <p:spPr/>
+        <p:txBody>
+          <a:bodyPr/>
+          <a:lstStyle/>
+          <a:p>
+            <a:fld id="{E83D2FD5-BBDA-43D0-B172-791327EA2B6A}" type="slidenum">
+              <a:rPr lang="ru-RU" smtClean="0"/>
+              <a:t>11</a:t>
+            </a:fld>
+            <a:endParaRPr lang="ru-RU"/>
+          </a:p>
+        </p:txBody>
+      </p:sp>
+      <p:pic>
+        <p:nvPicPr>
+          <p:cNvPr id="5" name="Рисунок 4"/>
+          <p:cNvPicPr>
+            <a:picLocks noChangeAspect="1"/>
+          </p:cNvPicPr>
+          <p:nvPr/>
+        </p:nvPicPr>
+        <p:blipFill rotWithShape="1">
+          <a:blip r:embed="rId2"/>
+          <a:srcRect l="17711" t="-6989" r="18768" b="2856"/>
+          <a:stretch/>
+        </p:blipFill>
+        <p:spPr>
+          <a:xfrm>
+            <a:off x="428017" y="2021184"/>
+            <a:ext cx="6702455" cy="589050"/>
+          </a:xfrm>
+          <a:prstGeom prst="rect">
+            <a:avLst/>
+          </a:prstGeom>
+        </p:spPr>
+      </p:pic>
+      <p:sp>
+        <p:nvSpPr>
+          <p:cNvPr id="7" name="Заголовок 1">
+            <a:extLst>
+              <a:ext uri="{FF2B5EF4-FFF2-40B4-BE49-F238E27FC236}">
+                <a16:creationId xmlns:a16="http://schemas.microsoft.com/office/drawing/2014/main" id="{1802D59D-6A83-151A-EEA2-678960399BE4}"/>
+              </a:ext>
+            </a:extLst>
+          </p:cNvPr>
+          <p:cNvSpPr>
+            <a:spLocks noGrp="1"/>
+          </p:cNvSpPr>
+          <p:nvPr>
+            <p:ph type="title"/>
+          </p:nvPr>
+        </p:nvSpPr>
+        <p:spPr>
+          <a:xfrm>
+            <a:off x="428017" y="-72232"/>
+            <a:ext cx="10818160" cy="1325563"/>
+          </a:xfrm>
+        </p:spPr>
+        <p:txBody>
+          <a:bodyPr>
+            <a:normAutofit/>
+          </a:bodyPr>
+          <a:lstStyle/>
+          <a:p>
+            <a:r>
+              <a:rPr lang="ru-RU" sz="3600" dirty="0" smtClean="0">
+                <a:latin typeface="Times New Roman" panose="02020603050405020304" pitchFamily="18" charset="0"/>
+                <a:cs typeface="Times New Roman" panose="02020603050405020304" pitchFamily="18" charset="0"/>
+              </a:rPr>
+              <a:t>Обучение модели градиентного бустинга</a:t>
+            </a:r>
+            <a:endParaRPr lang="ru-RU" sz="3600" dirty="0">
+              <a:latin typeface="Times New Roman" panose="02020603050405020304" pitchFamily="18" charset="0"/>
+              <a:cs typeface="Times New Roman" panose="02020603050405020304" pitchFamily="18" charset="0"/>
+            </a:endParaRPr>
+          </a:p>
+        </p:txBody>
+      </p:sp>
+      <p:sp>
+        <p:nvSpPr>
+          <p:cNvPr id="8" name="TextBox 7"/>
+          <p:cNvSpPr txBox="1"/>
+          <p:nvPr/>
+        </p:nvSpPr>
+        <p:spPr>
+          <a:xfrm>
+            <a:off x="6816436" y="3989770"/>
+            <a:ext cx="184731" cy="369332"/>
+          </a:xfrm>
+          <a:prstGeom prst="rect">
+            <a:avLst/>
+          </a:prstGeom>
+          <a:noFill/>
+        </p:spPr>
+        <p:txBody>
+          <a:bodyPr wrap="none" rtlCol="0">
+            <a:spAutoFit/>
+          </a:bodyPr>
+          <a:lstStyle/>
+          <a:p>
+            <a:endParaRPr lang="ru-RU" dirty="0"/>
+          </a:p>
+        </p:txBody>
+      </p:sp>
+      <p:pic>
+        <p:nvPicPr>
+          <p:cNvPr id="9" name="Рисунок 8"/>
+          <p:cNvPicPr>
+            <a:picLocks noChangeAspect="1"/>
+          </p:cNvPicPr>
+          <p:nvPr/>
+        </p:nvPicPr>
+        <p:blipFill rotWithShape="1">
+          <a:blip r:embed="rId3"/>
+          <a:srcRect r="19464"/>
+          <a:stretch/>
+        </p:blipFill>
+        <p:spPr>
+          <a:xfrm>
+            <a:off x="667108" y="2986828"/>
+            <a:ext cx="7230023" cy="2379499"/>
+          </a:xfrm>
+          <a:prstGeom prst="rect">
+            <a:avLst/>
+          </a:prstGeom>
+        </p:spPr>
+      </p:pic>
+      <p:sp>
+        <p:nvSpPr>
+          <p:cNvPr id="10" name="TextBox 9"/>
+          <p:cNvSpPr txBox="1"/>
+          <p:nvPr/>
+        </p:nvSpPr>
+        <p:spPr>
+          <a:xfrm>
+            <a:off x="8289476" y="2315709"/>
+            <a:ext cx="3736270" cy="2308324"/>
+          </a:xfrm>
+          <a:prstGeom prst="rect">
+            <a:avLst/>
+          </a:prstGeom>
+          <a:noFill/>
+        </p:spPr>
+        <p:txBody>
+          <a:bodyPr wrap="square" rtlCol="0">
+            <a:spAutoFit/>
+          </a:bodyPr>
+          <a:lstStyle/>
+          <a:p>
+            <a:r>
+              <a:rPr lang="ru-RU" sz="2400" dirty="0" smtClean="0">
+                <a:latin typeface="Times New Roman" panose="02020603050405020304" pitchFamily="18" charset="0"/>
+                <a:cs typeface="Times New Roman" panose="02020603050405020304" pitchFamily="18" charset="0"/>
+              </a:rPr>
+              <a:t>Модель обучается на </a:t>
+            </a:r>
+            <a:r>
+              <a:rPr lang="ru-RU" sz="2400" dirty="0" smtClean="0">
+                <a:latin typeface="Times New Roman" panose="02020603050405020304" pitchFamily="18" charset="0"/>
+                <a:cs typeface="Times New Roman" panose="02020603050405020304" pitchFamily="18" charset="0"/>
+              </a:rPr>
+              <a:t>наборе</a:t>
+            </a:r>
+            <a:r>
+              <a:rPr lang="en-US" sz="2400" dirty="0" smtClean="0">
+                <a:latin typeface="Times New Roman" panose="02020603050405020304" pitchFamily="18" charset="0"/>
+                <a:cs typeface="Times New Roman" panose="02020603050405020304" pitchFamily="18" charset="0"/>
+              </a:rPr>
+              <a:t> </a:t>
+            </a:r>
+            <a:r>
+              <a:rPr lang="ru-RU" sz="2400" dirty="0" smtClean="0">
+                <a:latin typeface="Times New Roman" panose="02020603050405020304" pitchFamily="18" charset="0"/>
+                <a:cs typeface="Times New Roman" panose="02020603050405020304" pitchFamily="18" charset="0"/>
+              </a:rPr>
+              <a:t>данных</a:t>
+            </a:r>
+            <a:r>
+              <a:rPr lang="en-US" sz="2400" dirty="0" smtClean="0">
+                <a:latin typeface="Times New Roman" panose="02020603050405020304" pitchFamily="18" charset="0"/>
+                <a:cs typeface="Times New Roman" panose="02020603050405020304" pitchFamily="18" charset="0"/>
+              </a:rPr>
+              <a:t> JM1</a:t>
+            </a:r>
+            <a:r>
+              <a:rPr lang="ru-RU" sz="2400" dirty="0" smtClean="0">
+                <a:latin typeface="Times New Roman" panose="02020603050405020304" pitchFamily="18" charset="0"/>
+                <a:cs typeface="Times New Roman" panose="02020603050405020304" pitchFamily="18" charset="0"/>
+              </a:rPr>
+              <a:t>, </a:t>
+            </a:r>
+            <a:r>
+              <a:rPr lang="ru-RU" sz="2400" dirty="0" smtClean="0">
+                <a:latin typeface="Times New Roman" panose="02020603050405020304" pitchFamily="18" charset="0"/>
+                <a:cs typeface="Times New Roman" panose="02020603050405020304" pitchFamily="18" charset="0"/>
+              </a:rPr>
+              <a:t>который представляет собой матрицу </a:t>
+            </a:r>
+            <a:r>
+              <a:rPr lang="ru-RU" sz="2400" dirty="0" smtClean="0">
+                <a:latin typeface="Times New Roman" panose="02020603050405020304" pitchFamily="18" charset="0"/>
+                <a:cs typeface="Times New Roman" panose="02020603050405020304" pitchFamily="18" charset="0"/>
+              </a:rPr>
+              <a:t>метрик, </a:t>
+            </a:r>
+            <a:r>
+              <a:rPr lang="ru-RU" sz="2400" dirty="0" smtClean="0">
+                <a:latin typeface="Times New Roman" panose="02020603050405020304" pitchFamily="18" charset="0"/>
+                <a:cs typeface="Times New Roman" panose="02020603050405020304" pitchFamily="18" charset="0"/>
+              </a:rPr>
+              <a:t>вычисленных для модулей на </a:t>
+            </a:r>
+            <a:r>
+              <a:rPr lang="en-US" sz="2400" dirty="0" smtClean="0">
+                <a:latin typeface="Times New Roman" panose="02020603050405020304" pitchFamily="18" charset="0"/>
+                <a:cs typeface="Times New Roman" panose="02020603050405020304" pitchFamily="18" charset="0"/>
+              </a:rPr>
+              <a:t>C++</a:t>
+            </a:r>
+            <a:r>
+              <a:rPr lang="ru-RU" sz="2400" dirty="0" smtClean="0">
+                <a:latin typeface="Times New Roman" panose="02020603050405020304" pitchFamily="18" charset="0"/>
+                <a:cs typeface="Times New Roman" panose="02020603050405020304" pitchFamily="18" charset="0"/>
+              </a:rPr>
+              <a:t>.</a:t>
+            </a:r>
+            <a:endParaRPr lang="ru-RU" sz="2400" dirty="0">
+              <a:latin typeface="Times New Roman" panose="02020603050405020304" pitchFamily="18" charset="0"/>
+              <a:cs typeface="Times New Roman" panose="02020603050405020304" pitchFamily="18" charset="0"/>
+            </a:endParaRPr>
+          </a:p>
+        </p:txBody>
+      </p:sp>
+    </p:spTree>
+    <p:extLst>
+      <p:ext uri="{BB962C8B-B14F-4D97-AF65-F5344CB8AC3E}">
+        <p14:creationId xmlns:p14="http://schemas.microsoft.com/office/powerpoint/2010/main" val="2934405594"/>
+      </p:ext>
+    </p:extLst>
+  </p:cSld>
+  <p:clrMapOvr>
+    <a:masterClrMapping/>
+  </p:clrMapOvr>
+</p:sld>
+</file>
+
+<file path=ppt/slides/slide12.xml><?xml version="1.0" encoding="utf-8"?>
+<p:sld xmlns:a="http://schemas.openxmlformats.org/drawingml/2006/main" xmlns:r="http://schemas.openxmlformats.org/officeDocument/2006/relationships" xmlns:p="http://schemas.openxmlformats.org/presentationml/2006/main">
+  <p:cSld>
+    <p:spTree>
+      <p:nvGrpSpPr>
+        <p:cNvPr id="1" name=""/>
+        <p:cNvGrpSpPr/>
+        <p:nvPr/>
+      </p:nvGrpSpPr>
+      <p:grpSpPr>
+        <a:xfrm>
+          <a:off x="0" y="0"/>
+          <a:ext cx="0" cy="0"/>
+          <a:chOff x="0" y="0"/>
+          <a:chExt cx="0" cy="0"/>
+        </a:xfrm>
+      </p:grpSpPr>
+      <p:sp>
+        <p:nvSpPr>
+          <p:cNvPr id="2" name="Заголовок 1">
+            <a:extLst>
+              <a:ext uri="{FF2B5EF4-FFF2-40B4-BE49-F238E27FC236}">
+                <a16:creationId xmlns:a16="http://schemas.microsoft.com/office/drawing/2014/main" id="{1802D59D-6A83-151A-EEA2-678960399BE4}"/>
+              </a:ext>
+            </a:extLst>
+          </p:cNvPr>
+          <p:cNvSpPr>
+            <a:spLocks noGrp="1"/>
+          </p:cNvSpPr>
+          <p:nvPr>
+            <p:ph type="title"/>
+          </p:nvPr>
+        </p:nvSpPr>
+        <p:spPr>
+          <a:xfrm>
+            <a:off x="428017" y="-72232"/>
+            <a:ext cx="10818160" cy="1325563"/>
+          </a:xfrm>
+        </p:spPr>
+        <p:txBody>
+          <a:bodyPr>
+            <a:normAutofit/>
+          </a:bodyPr>
+          <a:lstStyle/>
+          <a:p>
+            <a:r>
+              <a:rPr lang="ru-RU" sz="3600" dirty="0" smtClean="0">
+                <a:latin typeface="Times New Roman" panose="02020603050405020304" pitchFamily="18" charset="0"/>
+                <a:cs typeface="Times New Roman" panose="02020603050405020304" pitchFamily="18" charset="0"/>
+              </a:rPr>
+              <a:t>Классификация кода по наличию дефекта</a:t>
+            </a:r>
+            <a:endParaRPr lang="ru-RU" sz="3600" dirty="0">
+              <a:latin typeface="Times New Roman" panose="02020603050405020304" pitchFamily="18" charset="0"/>
+              <a:cs typeface="Times New Roman" panose="02020603050405020304" pitchFamily="18" charset="0"/>
+            </a:endParaRPr>
+          </a:p>
+        </p:txBody>
+      </p:sp>
+      <p:sp>
+        <p:nvSpPr>
+          <p:cNvPr id="8" name="Номер слайда 7">
+            <a:extLst>
+              <a:ext uri="{FF2B5EF4-FFF2-40B4-BE49-F238E27FC236}">
+                <a16:creationId xmlns:a16="http://schemas.microsoft.com/office/drawing/2014/main" id="{356084EE-032E-E484-80F4-B50DED37102A}"/>
+              </a:ext>
+            </a:extLst>
+          </p:cNvPr>
+          <p:cNvSpPr>
+            <a:spLocks noGrp="1"/>
+          </p:cNvSpPr>
+          <p:nvPr>
+            <p:ph type="sldNum" sz="quarter" idx="12"/>
+          </p:nvPr>
+        </p:nvSpPr>
+        <p:spPr/>
+        <p:txBody>
+          <a:bodyPr/>
+          <a:lstStyle/>
+          <a:p>
+            <a:fld id="{E83D2FD5-BBDA-43D0-B172-791327EA2B6A}" type="slidenum">
+              <a:rPr lang="ru-RU" smtClean="0"/>
+              <a:t>12</a:t>
             </a:fld>
             <a:endParaRPr lang="ru-RU"/>
           </a:p>
@@ -4107,7 +4647,7 @@
 </p:sld>
 </file>
 
-<file path=ppt/slides/slide11.xml><?xml version="1.0" encoding="utf-8"?>
+<file path=ppt/slides/slide13.xml><?xml version="1.0" encoding="utf-8"?>
 <p:sld xmlns:a="http://schemas.openxmlformats.org/drawingml/2006/main" xmlns:r="http://schemas.openxmlformats.org/officeDocument/2006/relationships" xmlns:p="http://schemas.openxmlformats.org/presentationml/2006/main">
   <p:cSld>
     <p:spTree>
@@ -4189,7 +4729,7 @@
           <a:p>
             <a:fld id="{E83D2FD5-BBDA-43D0-B172-791327EA2B6A}" type="slidenum">
               <a:rPr lang="ru-RU" smtClean="0"/>
-              <a:t>11</a:t>
+              <a:t>13</a:t>
             </a:fld>
             <a:endParaRPr lang="ru-RU"/>
           </a:p>
@@ -4486,7 +5026,7 @@
 </p:sld>
 </file>
 
-<file path=ppt/slides/slide12.xml><?xml version="1.0" encoding="utf-8"?>
+<file path=ppt/slides/slide14.xml><?xml version="1.0" encoding="utf-8"?>
 <p:sld xmlns:a="http://schemas.openxmlformats.org/drawingml/2006/main" xmlns:r="http://schemas.openxmlformats.org/officeDocument/2006/relationships" xmlns:p="http://schemas.openxmlformats.org/presentationml/2006/main">
   <p:cSld>
     <p:spTree>
@@ -4568,7 +5108,7 @@
           <a:p>
             <a:fld id="{E83D2FD5-BBDA-43D0-B172-791327EA2B6A}" type="slidenum">
               <a:rPr lang="ru-RU" smtClean="0"/>
-              <a:t>12</a:t>
+              <a:t>14</a:t>
             </a:fld>
             <a:endParaRPr lang="ru-RU"/>
           </a:p>
@@ -4617,7 +5157,7 @@
 </p:sld>
 </file>
 
-<file path=ppt/slides/slide13.xml><?xml version="1.0" encoding="utf-8"?>
+<file path=ppt/slides/slide15.xml><?xml version="1.0" encoding="utf-8"?>
 <p:sld xmlns:a="http://schemas.openxmlformats.org/drawingml/2006/main" xmlns:r="http://schemas.openxmlformats.org/officeDocument/2006/relationships" xmlns:p="http://schemas.openxmlformats.org/presentationml/2006/main">
   <p:cSld>
     <p:spTree>
@@ -4699,7 +5239,7 @@
           <a:p>
             <a:fld id="{E83D2FD5-BBDA-43D0-B172-791327EA2B6A}" type="slidenum">
               <a:rPr lang="ru-RU" smtClean="0"/>
-              <a:t>13</a:t>
+              <a:t>15</a:t>
             </a:fld>
             <a:endParaRPr lang="ru-RU"/>
           </a:p>
@@ -4714,7 +5254,7 @@
           <p:nvPr/>
         </p:nvPicPr>
         <p:blipFill>
-          <a:blip r:embed="rId3">
+          <a:blip r:embed="rId2">
             <a:extLst>
               <a:ext uri="{28A0092B-C50C-407E-A947-70E740481C1C}">
                 <a14:useLocalDpi xmlns:a14="http://schemas.microsoft.com/office/drawing/2010/main" val="0"/>
@@ -4876,7 +5416,7 @@
 </p:sld>
 </file>
 
-<file path=ppt/slides/slide14.xml><?xml version="1.0" encoding="utf-8"?>
+<file path=ppt/slides/slide16.xml><?xml version="1.0" encoding="utf-8"?>
 <p:sld xmlns:a="http://schemas.openxmlformats.org/drawingml/2006/main" xmlns:r="http://schemas.openxmlformats.org/officeDocument/2006/relationships" xmlns:p="http://schemas.openxmlformats.org/presentationml/2006/main">
   <p:cSld>
     <p:spTree>
@@ -4926,7 +5466,7 @@
                 <a:latin typeface="Times New Roman" panose="02020603050405020304" pitchFamily="18" charset="0"/>
                 <a:cs typeface="Times New Roman" panose="02020603050405020304" pitchFamily="18" charset="0"/>
               </a:rPr>
-              <a:t>Анализ времени выполнения программы</a:t>
+              <a:t>Оценка времени выполнения программы</a:t>
             </a:r>
             <a:endParaRPr lang="ru-RU" sz="3600" dirty="0">
               <a:latin typeface="Times New Roman" panose="02020603050405020304" pitchFamily="18" charset="0"/>
@@ -4958,7 +5498,7 @@
           <a:p>
             <a:fld id="{E83D2FD5-BBDA-43D0-B172-791327EA2B6A}" type="slidenum">
               <a:rPr lang="ru-RU" smtClean="0"/>
-              <a:t>14</a:t>
+              <a:t>16</a:t>
             </a:fld>
             <a:endParaRPr lang="ru-RU"/>
           </a:p>
@@ -4973,7 +5513,7 @@
           <p:nvPr/>
         </p:nvPicPr>
         <p:blipFill>
-          <a:blip r:embed="rId3">
+          <a:blip r:embed="rId2">
             <a:extLst>
               <a:ext uri="{28A0092B-C50C-407E-A947-70E740481C1C}">
                 <a14:useLocalDpi xmlns:a14="http://schemas.microsoft.com/office/drawing/2010/main" val="0"/>
@@ -5007,7 +5547,7 @@
 </p:sld>
 </file>
 
-<file path=ppt/slides/slide15.xml><?xml version="1.0" encoding="utf-8"?>
+<file path=ppt/slides/slide17.xml><?xml version="1.0" encoding="utf-8"?>
 <p:sld xmlns:a="http://schemas.openxmlformats.org/drawingml/2006/main" xmlns:r="http://schemas.openxmlformats.org/officeDocument/2006/relationships" xmlns:p="http://schemas.openxmlformats.org/presentationml/2006/main">
   <p:cSld>
     <p:spTree>
@@ -5089,7 +5629,7 @@
           <a:p>
             <a:fld id="{E83D2FD5-BBDA-43D0-B172-791327EA2B6A}" type="slidenum">
               <a:rPr lang="ru-RU" smtClean="0"/>
-              <a:t>15</a:t>
+              <a:t>17</a:t>
             </a:fld>
             <a:endParaRPr lang="ru-RU" dirty="0"/>
           </a:p>
@@ -5157,10 +5697,6 @@
               </a:rPr>
               <a:t>:</a:t>
             </a:r>
-            <a:endParaRPr lang="ru-RU" sz="2400" dirty="0">
-              <a:latin typeface="Times New Roman" panose="02020603050405020304" pitchFamily="18" charset="0"/>
-              <a:ea typeface="Times New Roman" panose="02020603050405020304" pitchFamily="18" charset="0"/>
-            </a:endParaRPr>
           </a:p>
           <a:p>
             <a:pPr marL="342900" lvl="0" indent="-342900" algn="just">
@@ -5697,14 +6233,7 @@
                 <a:latin typeface="Times New Roman" panose="02020603050405020304" pitchFamily="18" charset="0"/>
                 <a:cs typeface="Times New Roman" panose="02020603050405020304" pitchFamily="18" charset="0"/>
               </a:rPr>
-              <a:t>Дефект </a:t>
-            </a:r>
-            <a:r>
-              <a:rPr lang="ru-RU" sz="2400" dirty="0" smtClean="0">
-                <a:latin typeface="Times New Roman" panose="02020603050405020304" pitchFamily="18" charset="0"/>
-                <a:cs typeface="Times New Roman" panose="02020603050405020304" pitchFamily="18" charset="0"/>
-              </a:rPr>
-              <a:t>–</a:t>
+              <a:t>Дефект –</a:t>
             </a:r>
             <a:r>
               <a:rPr lang="en-US" sz="2400" dirty="0" smtClean="0">
@@ -5830,7 +6359,7 @@
                 <a14:useLocalDpi xmlns:a14="http://schemas.microsoft.com/office/drawing/2010/main" val="0"/>
               </a:ext>
               <a:ext uri="{96DAC541-7B7A-43D3-8B79-37D633B846F1}">
-                <asvg:svgBlip xmlns="" xmlns:asvg="http://schemas.microsoft.com/office/drawing/2016/SVG/main" r:embed="rId3"/>
+                <asvg:svgBlip xmlns:asvg="http://schemas.microsoft.com/office/drawing/2016/SVG/main" xmlns="" r:embed="rId3"/>
               </a:ext>
             </a:extLst>
           </a:blip>
@@ -8015,7 +8544,36 @@
       </p:grpSpPr>
       <p:sp>
         <p:nvSpPr>
-          <p:cNvPr id="2" name="Заголовок 1">
+          <p:cNvPr id="8" name="Номер слайда 7">
+            <a:extLst>
+              <a:ext uri="{FF2B5EF4-FFF2-40B4-BE49-F238E27FC236}">
+                <a16:creationId xmlns:a16="http://schemas.microsoft.com/office/drawing/2014/main" id="{356084EE-032E-E484-80F4-B50DED37102A}"/>
+              </a:ext>
+            </a:extLst>
+          </p:cNvPr>
+          <p:cNvSpPr>
+            <a:spLocks noGrp="1"/>
+          </p:cNvSpPr>
+          <p:nvPr>
+            <p:ph type="sldNum" sz="quarter" idx="12"/>
+          </p:nvPr>
+        </p:nvSpPr>
+        <p:spPr/>
+        <p:txBody>
+          <a:bodyPr/>
+          <a:lstStyle/>
+          <a:p>
+            <a:fld id="{E83D2FD5-BBDA-43D0-B172-791327EA2B6A}" type="slidenum">
+              <a:rPr lang="ru-RU" smtClean="0"/>
+              <a:t>9</a:t>
+            </a:fld>
+            <a:endParaRPr lang="ru-RU"/>
+          </a:p>
+        </p:txBody>
+      </p:sp>
+      <p:sp>
+        <p:nvSpPr>
+          <p:cNvPr id="17" name="Заголовок 1">
             <a:extLst>
               <a:ext uri="{FF2B5EF4-FFF2-40B4-BE49-F238E27FC236}">
                 <a16:creationId xmlns:a16="http://schemas.microsoft.com/office/drawing/2014/main" id="{1802D59D-6A83-151A-EEA2-678960399BE4}"/>
@@ -8055,271 +8613,36 @@
           </a:p>
         </p:txBody>
       </p:sp>
-      <p:sp>
-        <p:nvSpPr>
-          <p:cNvPr id="8" name="Номер слайда 7">
-            <a:extLst>
-              <a:ext uri="{FF2B5EF4-FFF2-40B4-BE49-F238E27FC236}">
-                <a16:creationId xmlns:a16="http://schemas.microsoft.com/office/drawing/2014/main" id="{356084EE-032E-E484-80F4-B50DED37102A}"/>
-              </a:ext>
-            </a:extLst>
-          </p:cNvPr>
-          <p:cNvSpPr>
-            <a:spLocks noGrp="1"/>
-          </p:cNvSpPr>
-          <p:nvPr>
-            <p:ph type="sldNum" sz="quarter" idx="12"/>
-          </p:nvPr>
-        </p:nvSpPr>
-        <p:spPr/>
-        <p:txBody>
-          <a:bodyPr/>
-          <a:lstStyle/>
-          <a:p>
-            <a:fld id="{E83D2FD5-BBDA-43D0-B172-791327EA2B6A}" type="slidenum">
-              <a:rPr lang="ru-RU" smtClean="0"/>
-              <a:t>9</a:t>
-            </a:fld>
-            <a:endParaRPr lang="ru-RU"/>
-          </a:p>
-        </p:txBody>
-      </p:sp>
       <p:pic>
         <p:nvPicPr>
-          <p:cNvPr id="7" name="Рисунок 6"/>
+          <p:cNvPr id="18" name="Рисунок 17"/>
           <p:cNvPicPr>
             <a:picLocks noChangeAspect="1"/>
           </p:cNvPicPr>
           <p:nvPr/>
         </p:nvPicPr>
-        <p:blipFill rotWithShape="1">
-          <a:blip r:embed="rId2"/>
-          <a:srcRect l="34608" t="-13941" r="36003" b="-23649"/>
-          <a:stretch/>
+        <p:blipFill>
+          <a:blip r:embed="rId2" cstate="hqprint">
+            <a:extLst>
+              <a:ext uri="{28A0092B-C50C-407E-A947-70E740481C1C}">
+                <a14:useLocalDpi xmlns:a14="http://schemas.microsoft.com/office/drawing/2010/main" val="0"/>
+              </a:ext>
+            </a:extLst>
+          </a:blip>
+          <a:stretch>
+            <a:fillRect/>
+          </a:stretch>
         </p:blipFill>
         <p:spPr>
           <a:xfrm>
-            <a:off x="5213863" y="1630190"/>
-            <a:ext cx="2980895" cy="748146"/>
+            <a:off x="2146709" y="1013143"/>
+            <a:ext cx="7835491" cy="5708332"/>
           </a:xfrm>
           <a:prstGeom prst="rect">
             <a:avLst/>
           </a:prstGeom>
         </p:spPr>
       </p:pic>
-      <p:pic>
-        <p:nvPicPr>
-          <p:cNvPr id="10" name="Рисунок 9"/>
-          <p:cNvPicPr>
-            <a:picLocks noChangeAspect="1"/>
-          </p:cNvPicPr>
-          <p:nvPr/>
-        </p:nvPicPr>
-        <p:blipFill rotWithShape="1">
-          <a:blip r:embed="rId3"/>
-          <a:srcRect l="17711" t="-6989" r="18768" b="2856"/>
-          <a:stretch/>
-        </p:blipFill>
-        <p:spPr>
-          <a:xfrm>
-            <a:off x="5306227" y="2764487"/>
-            <a:ext cx="6702455" cy="589050"/>
-          </a:xfrm>
-          <a:prstGeom prst="rect">
-            <a:avLst/>
-          </a:prstGeom>
-        </p:spPr>
-      </p:pic>
-      <p:pic>
-        <p:nvPicPr>
-          <p:cNvPr id="11" name="Рисунок 10"/>
-          <p:cNvPicPr>
-            <a:picLocks noChangeAspect="1"/>
-          </p:cNvPicPr>
-          <p:nvPr/>
-        </p:nvPicPr>
-        <p:blipFill rotWithShape="1">
-          <a:blip r:embed="rId4"/>
-          <a:srcRect l="19221" t="-12618" r="20428" b="-11216"/>
-          <a:stretch/>
-        </p:blipFill>
-        <p:spPr>
-          <a:xfrm>
-            <a:off x="5306227" y="3929466"/>
-            <a:ext cx="6359726" cy="699570"/>
-          </a:xfrm>
-          <a:prstGeom prst="rect">
-            <a:avLst/>
-          </a:prstGeom>
-        </p:spPr>
-      </p:pic>
-      <p:pic>
-        <p:nvPicPr>
-          <p:cNvPr id="12" name="Рисунок 11"/>
-          <p:cNvPicPr>
-            <a:picLocks noChangeAspect="1"/>
-          </p:cNvPicPr>
-          <p:nvPr/>
-        </p:nvPicPr>
-        <p:blipFill rotWithShape="1">
-          <a:blip r:embed="rId5"/>
-          <a:srcRect l="31895" t="-5415" r="33705" b="6721"/>
-          <a:stretch/>
-        </p:blipFill>
-        <p:spPr>
-          <a:xfrm>
-            <a:off x="5489544" y="4946635"/>
-            <a:ext cx="3509321" cy="938897"/>
-          </a:xfrm>
-          <a:prstGeom prst="rect">
-            <a:avLst/>
-          </a:prstGeom>
-        </p:spPr>
-      </p:pic>
-      <p:sp>
-        <p:nvSpPr>
-          <p:cNvPr id="13" name="TextBox 12"/>
-          <p:cNvSpPr txBox="1"/>
-          <p:nvPr/>
-        </p:nvSpPr>
-        <p:spPr>
-          <a:xfrm>
-            <a:off x="646544" y="1683985"/>
-            <a:ext cx="2567709" cy="461665"/>
-          </a:xfrm>
-          <a:prstGeom prst="rect">
-            <a:avLst/>
-          </a:prstGeom>
-          <a:noFill/>
-        </p:spPr>
-        <p:txBody>
-          <a:bodyPr wrap="square" rtlCol="0">
-            <a:spAutoFit/>
-          </a:bodyPr>
-          <a:lstStyle/>
-          <a:p>
-            <a:r>
-              <a:rPr lang="ru-RU" sz="2400" dirty="0" smtClean="0">
-                <a:latin typeface="Times New Roman" panose="02020603050405020304" pitchFamily="18" charset="0"/>
-                <a:cs typeface="Times New Roman" panose="02020603050405020304" pitchFamily="18" charset="0"/>
-              </a:rPr>
-              <a:t>Критерий Джини:</a:t>
-            </a:r>
-            <a:endParaRPr lang="ru-RU" sz="2400" dirty="0">
-              <a:latin typeface="Times New Roman" panose="02020603050405020304" pitchFamily="18" charset="0"/>
-              <a:cs typeface="Times New Roman" panose="02020603050405020304" pitchFamily="18" charset="0"/>
-            </a:endParaRPr>
-          </a:p>
-        </p:txBody>
-      </p:sp>
-      <p:sp>
-        <p:nvSpPr>
-          <p:cNvPr id="14" name="TextBox 13"/>
-          <p:cNvSpPr txBox="1"/>
-          <p:nvPr/>
-        </p:nvSpPr>
-        <p:spPr>
-          <a:xfrm>
-            <a:off x="646544" y="2764487"/>
-            <a:ext cx="4438075" cy="461665"/>
-          </a:xfrm>
-          <a:prstGeom prst="rect">
-            <a:avLst/>
-          </a:prstGeom>
-          <a:noFill/>
-        </p:spPr>
-        <p:txBody>
-          <a:bodyPr wrap="square" rtlCol="0">
-            <a:spAutoFit/>
-          </a:bodyPr>
-          <a:lstStyle/>
-          <a:p>
-            <a:r>
-              <a:rPr lang="ru-RU" sz="2400" dirty="0" smtClean="0">
-                <a:latin typeface="Times New Roman" panose="02020603050405020304" pitchFamily="18" charset="0"/>
-                <a:cs typeface="Times New Roman" panose="02020603050405020304" pitchFamily="18" charset="0"/>
-              </a:rPr>
-              <a:t>Модель градиентного бустинга:</a:t>
-            </a:r>
-            <a:endParaRPr lang="ru-RU" sz="2400" dirty="0">
-              <a:latin typeface="Times New Roman" panose="02020603050405020304" pitchFamily="18" charset="0"/>
-              <a:cs typeface="Times New Roman" panose="02020603050405020304" pitchFamily="18" charset="0"/>
-            </a:endParaRPr>
-          </a:p>
-        </p:txBody>
-      </p:sp>
-      <p:sp>
-        <p:nvSpPr>
-          <p:cNvPr id="15" name="TextBox 14"/>
-          <p:cNvSpPr txBox="1"/>
-          <p:nvPr/>
-        </p:nvSpPr>
-        <p:spPr>
-          <a:xfrm>
-            <a:off x="646544" y="3951212"/>
-            <a:ext cx="5095328" cy="461665"/>
-          </a:xfrm>
-          <a:prstGeom prst="rect">
-            <a:avLst/>
-          </a:prstGeom>
-          <a:noFill/>
-        </p:spPr>
-        <p:txBody>
-          <a:bodyPr wrap="square" rtlCol="0">
-            <a:spAutoFit/>
-          </a:bodyPr>
-          <a:lstStyle/>
-          <a:p>
-            <a:r>
-              <a:rPr lang="ru-RU" sz="2400" dirty="0" smtClean="0">
-                <a:latin typeface="Times New Roman" panose="02020603050405020304" pitchFamily="18" charset="0"/>
-                <a:cs typeface="Times New Roman" panose="02020603050405020304" pitchFamily="18" charset="0"/>
-              </a:rPr>
-              <a:t>Логарифмическая функция потерь:</a:t>
-            </a:r>
-            <a:endParaRPr lang="ru-RU" sz="2400" dirty="0">
-              <a:latin typeface="Times New Roman" panose="02020603050405020304" pitchFamily="18" charset="0"/>
-              <a:cs typeface="Times New Roman" panose="02020603050405020304" pitchFamily="18" charset="0"/>
-            </a:endParaRPr>
-          </a:p>
-        </p:txBody>
-      </p:sp>
-      <p:sp>
-        <p:nvSpPr>
-          <p:cNvPr id="16" name="TextBox 15"/>
-          <p:cNvSpPr txBox="1"/>
-          <p:nvPr/>
-        </p:nvSpPr>
-        <p:spPr>
-          <a:xfrm>
-            <a:off x="646543" y="5195874"/>
-            <a:ext cx="2567709" cy="461665"/>
-          </a:xfrm>
-          <a:prstGeom prst="rect">
-            <a:avLst/>
-          </a:prstGeom>
-          <a:noFill/>
-        </p:spPr>
-        <p:txBody>
-          <a:bodyPr wrap="square" rtlCol="0">
-            <a:spAutoFit/>
-          </a:bodyPr>
-          <a:lstStyle/>
-          <a:p>
-            <a:r>
-              <a:rPr lang="ru-RU" sz="2400" dirty="0" smtClean="0">
-                <a:latin typeface="Times New Roman" panose="02020603050405020304" pitchFamily="18" charset="0"/>
-                <a:cs typeface="Times New Roman" panose="02020603050405020304" pitchFamily="18" charset="0"/>
-              </a:rPr>
-              <a:t>Антиградиент:</a:t>
-            </a:r>
-            <a:endParaRPr lang="ru-RU" sz="2400" dirty="0">
-              <a:latin typeface="Times New Roman" panose="02020603050405020304" pitchFamily="18" charset="0"/>
-              <a:cs typeface="Times New Roman" panose="02020603050405020304" pitchFamily="18" charset="0"/>
-            </a:endParaRPr>
-          </a:p>
-        </p:txBody>
-      </p:sp>
     </p:spTree>
     <p:extLst>
       <p:ext uri="{BB962C8B-B14F-4D97-AF65-F5344CB8AC3E}">

</xml_diff>